<commit_message>
Še nekoliko več poročila
</commit_message>
<xml_diff>
--- a/PR2022-23_vmesna_14.pptx
+++ b/PR2022-23_vmesna_14.pptx
@@ -3646,7 +3646,7 @@
         </p:spPr>
         <p:txBody>
           <a:bodyPr>
-            <a:normAutofit/>
+            <a:normAutofit fontScale="85000" lnSpcReduction="20000"/>
           </a:bodyPr>
           <a:lstStyle/>
           <a:p>
@@ -3665,93 +3665,30 @@
               <a:buChar char="-"/>
             </a:pPr>
             <a:r>
-              <a:rPr lang="en-US" sz="1600" dirty="0" err="1"/>
-              <a:t>viri</a:t>
-            </a:r>
-            <a:r>
-              <a:rPr lang="en-US" sz="1600" dirty="0"/>
-              <a:t> </a:t>
-            </a:r>
-            <a:r>
-              <a:rPr lang="en-US" sz="1600" dirty="0" err="1"/>
+              <a:rPr lang="en-SI" sz="1600" dirty="0"/>
+              <a:t>Vir </a:t>
+            </a:r>
+            <a:r>
+              <a:rPr lang="en-SI" sz="1600" dirty="0" err="1"/>
               <a:t>podatkov</a:t>
             </a:r>
             <a:r>
-              <a:rPr lang="en-US" sz="1600" dirty="0"/>
-              <a:t> (</a:t>
-            </a:r>
-            <a:r>
-              <a:rPr lang="en-US" sz="1600" dirty="0" err="1"/>
-              <a:t>navedi</a:t>
-            </a:r>
-            <a:r>
-              <a:rPr lang="en-US" sz="1600" dirty="0"/>
-              <a:t> </a:t>
-            </a:r>
-            <a:r>
-              <a:rPr lang="en-US" sz="1600" dirty="0" err="1"/>
-              <a:t>povezavo</a:t>
-            </a:r>
-            <a:r>
-              <a:rPr lang="en-US" sz="1600" dirty="0"/>
-              <a:t> do </a:t>
-            </a:r>
-            <a:r>
-              <a:rPr lang="en-US" sz="1600" dirty="0" err="1"/>
-              <a:t>podatkov</a:t>
-            </a:r>
-            <a:r>
-              <a:rPr lang="en-US" sz="1600" dirty="0"/>
-              <a:t>, </a:t>
-            </a:r>
-            <a:r>
-              <a:rPr lang="en-US" sz="1600" dirty="0" err="1"/>
-              <a:t>boste</a:t>
-            </a:r>
-            <a:r>
-              <a:rPr lang="en-US" sz="1600" dirty="0"/>
-              <a:t> </a:t>
-            </a:r>
-            <a:r>
-              <a:rPr lang="en-US" sz="1600" dirty="0" err="1"/>
-              <a:t>uporabljali</a:t>
-            </a:r>
-            <a:r>
-              <a:rPr lang="en-US" sz="1600" dirty="0"/>
-              <a:t> </a:t>
-            </a:r>
-            <a:r>
-              <a:rPr lang="en-US" sz="1600" dirty="0" err="1"/>
-              <a:t>en</a:t>
-            </a:r>
-            <a:r>
-              <a:rPr lang="en-US" sz="1600" dirty="0"/>
-              <a:t> </a:t>
-            </a:r>
-            <a:r>
-              <a:rPr lang="en-US" sz="1600" dirty="0" err="1"/>
-              <a:t>ali</a:t>
-            </a:r>
-            <a:r>
-              <a:rPr lang="en-US" sz="1600" dirty="0"/>
-              <a:t> </a:t>
-            </a:r>
-            <a:r>
-              <a:rPr lang="en-US" sz="1600" dirty="0" err="1"/>
-              <a:t>več</a:t>
-            </a:r>
-            <a:r>
-              <a:rPr lang="en-US" sz="1600" dirty="0"/>
-              <a:t> </a:t>
-            </a:r>
-            <a:r>
-              <a:rPr lang="en-US" sz="1600" dirty="0" err="1"/>
-              <a:t>virov</a:t>
-            </a:r>
-            <a:r>
-              <a:rPr lang="en-US" sz="1600" dirty="0"/>
-              <a:t>?)</a:t>
-            </a:r>
+              <a:rPr lang="en-SI" sz="1600" dirty="0"/>
+              <a:t>: SURS</a:t>
+            </a:r>
+          </a:p>
+          <a:p>
+            <a:pPr lvl="1">
+              <a:buFontTx/>
+              <a:buChar char="-"/>
+            </a:pPr>
+            <a:r>
+              <a:rPr lang="en-US" sz="1300" dirty="0">
+                <a:hlinkClick r:id="rId2"/>
+              </a:rPr>
+              <a:t>https://pxweb.stat.si/SiStat/sl/Podrocja/Index/186/energetika</a:t>
+            </a:r>
+            <a:endParaRPr lang="en-US" sz="1300" dirty="0"/>
           </a:p>
           <a:p>
             <a:pPr>
@@ -3759,69 +3696,37 @@
               <a:buChar char="-"/>
             </a:pPr>
             <a:r>
-              <a:rPr lang="en-US" sz="1600" dirty="0" err="1"/>
-              <a:t>prvotni</a:t>
-            </a:r>
-            <a:r>
-              <a:rPr lang="en-US" sz="1600" dirty="0"/>
-              <a:t> </a:t>
-            </a:r>
-            <a:r>
-              <a:rPr lang="en-US" sz="1600" dirty="0" err="1"/>
+              <a:rPr lang="en-SI" sz="1600" dirty="0" err="1"/>
+              <a:t>Prvotni</a:t>
+            </a:r>
+            <a:r>
+              <a:rPr lang="en-SI" sz="1600" dirty="0"/>
+              <a:t> </a:t>
+            </a:r>
+            <a:r>
+              <a:rPr lang="en-SI" sz="1600" dirty="0" err="1"/>
               <a:t>namen</a:t>
             </a:r>
-            <a:r>
-              <a:rPr lang="en-US" sz="1600" dirty="0"/>
-              <a:t> </a:t>
-            </a:r>
-            <a:r>
-              <a:rPr lang="en-US" sz="1600" dirty="0" err="1"/>
-              <a:t>zbiranja</a:t>
-            </a:r>
-            <a:r>
-              <a:rPr lang="en-US" sz="1600" dirty="0"/>
-              <a:t> (</a:t>
-            </a:r>
-            <a:r>
-              <a:rPr lang="en-US" sz="1600" dirty="0" err="1"/>
-              <a:t>zakaj</a:t>
-            </a:r>
-            <a:r>
-              <a:rPr lang="en-US" sz="1600" dirty="0"/>
-              <a:t> so </a:t>
-            </a:r>
-            <a:r>
-              <a:rPr lang="en-US" sz="1600" dirty="0" err="1"/>
-              <a:t>jih</a:t>
-            </a:r>
-            <a:r>
-              <a:rPr lang="en-US" sz="1600" dirty="0"/>
-              <a:t> </a:t>
-            </a:r>
-            <a:r>
-              <a:rPr lang="en-US" sz="1600" dirty="0" err="1"/>
-              <a:t>avtorji</a:t>
-            </a:r>
-            <a:r>
-              <a:rPr lang="en-US" sz="1600" dirty="0"/>
-              <a:t> </a:t>
-            </a:r>
-            <a:r>
-              <a:rPr lang="en-US" sz="1600" dirty="0" err="1"/>
-              <a:t>zbirali</a:t>
-            </a:r>
-            <a:r>
-              <a:rPr lang="en-US" sz="1600" dirty="0"/>
-              <a:t> oz. </a:t>
-            </a:r>
-            <a:r>
-              <a:rPr lang="en-US" sz="1600" dirty="0" err="1"/>
-              <a:t>uporabili</a:t>
-            </a:r>
-            <a:r>
-              <a:rPr lang="en-US" sz="1600" dirty="0"/>
-              <a:t>)</a:t>
-            </a:r>
+            <a:endParaRPr lang="en-SI" sz="1600" dirty="0"/>
+          </a:p>
+          <a:p>
+            <a:pPr lvl="1">
+              <a:buFontTx/>
+              <a:buChar char="-"/>
+            </a:pPr>
+            <a:r>
+              <a:rPr lang="sl-SI" sz="1200" dirty="0"/>
+              <a:t>Namen zbiranja podatkov je analiza in merjenje različnih pojavov v družbi, gospodarstvu, okolju in drugih področjih, ki so pomembni za razvoj države in dobrobit njenih prebivalcev. Podatki </a:t>
+            </a:r>
+            <a:r>
+              <a:rPr lang="sl-SI" sz="1200" dirty="0" err="1"/>
+              <a:t>SURSa</a:t>
+            </a:r>
+            <a:r>
+              <a:rPr lang="sl-SI" sz="1200" dirty="0"/>
+              <a:t> se uporabljajo za različne namene, na primer pri sprejemanju odločitev na ravni vlade, pri načrtovanju gospodarskih politik in pri spremljanju trendov in sprememb v družbi.</a:t>
+            </a:r>
+            <a:endParaRPr lang="en-US" sz="1200" dirty="0"/>
           </a:p>
           <a:p>
             <a:pPr>
@@ -3829,121 +3734,237 @@
               <a:buChar char="-"/>
             </a:pPr>
             <a:r>
-              <a:rPr lang="en-US" sz="1600" dirty="0"/>
-              <a:t>tip </a:t>
-            </a:r>
-            <a:r>
-              <a:rPr lang="en-US" sz="1600" dirty="0" err="1"/>
+              <a:rPr lang="en-SI" sz="1600" dirty="0" err="1"/>
+              <a:t>Podatki</a:t>
+            </a:r>
+            <a:r>
+              <a:rPr lang="en-SI" sz="1600" dirty="0"/>
+              <a:t> so v </a:t>
+            </a:r>
+            <a:r>
+              <a:rPr lang="en-SI" sz="1600" dirty="0" err="1"/>
+              <a:t>obliki</a:t>
+            </a:r>
+            <a:r>
+              <a:rPr lang="en-SI" sz="1600" dirty="0"/>
+              <a:t> </a:t>
+            </a:r>
+            <a:r>
+              <a:rPr lang="en-SI" sz="1600" dirty="0" err="1"/>
+              <a:t>meritev</a:t>
+            </a:r>
+            <a:r>
+              <a:rPr lang="en-SI" sz="1600" dirty="0"/>
+              <a:t> in </a:t>
+            </a:r>
+            <a:r>
+              <a:rPr lang="en-SI" sz="1600" dirty="0" err="1"/>
+              <a:t>agregacije</a:t>
+            </a:r>
+            <a:r>
+              <a:rPr lang="en-SI" sz="1600" dirty="0"/>
+              <a:t> </a:t>
+            </a:r>
+            <a:r>
+              <a:rPr lang="en-SI" sz="1600" dirty="0" err="1"/>
               <a:t>podatkov</a:t>
             </a:r>
             <a:r>
-              <a:rPr lang="en-US" sz="1600" dirty="0"/>
-              <a:t> (</a:t>
-            </a:r>
-            <a:r>
-              <a:rPr lang="en-US" sz="1600" dirty="0" err="1"/>
-              <a:t>besedila</a:t>
-            </a:r>
-            <a:r>
-              <a:rPr lang="en-US" sz="1600" dirty="0"/>
+              <a:rPr lang="en-SI" sz="1600" dirty="0"/>
+              <a:t>. </a:t>
+            </a:r>
+            <a:r>
+              <a:rPr lang="en-SI" sz="1600" dirty="0" err="1"/>
+              <a:t>Obsegajo</a:t>
+            </a:r>
+            <a:r>
+              <a:rPr lang="en-SI" sz="1600" dirty="0"/>
+              <a:t> </a:t>
+            </a:r>
+            <a:r>
+              <a:rPr lang="en-SI" sz="1600" dirty="0" err="1"/>
+              <a:t>različne</a:t>
+            </a:r>
+            <a:r>
+              <a:rPr lang="en-SI" sz="1600" dirty="0"/>
+              <a:t> </a:t>
+            </a:r>
+            <a:r>
+              <a:rPr lang="en-SI" sz="1600" dirty="0" err="1"/>
+              <a:t>domene</a:t>
+            </a:r>
+            <a:r>
+              <a:rPr lang="en-SI" sz="1600" dirty="0"/>
+              <a:t> in </a:t>
+            </a:r>
+            <a:r>
+              <a:rPr lang="en-SI" sz="1600" dirty="0" err="1"/>
+              <a:t>kategorije</a:t>
+            </a:r>
+            <a:endParaRPr lang="en-SI" sz="1600" dirty="0"/>
+          </a:p>
+          <a:p>
+            <a:pPr lvl="1">
+              <a:buFontTx/>
+              <a:buChar char="-"/>
+            </a:pPr>
+            <a:r>
+              <a:rPr lang="en-SI" sz="1300" dirty="0"/>
+              <a:t>Na primer, </a:t>
+            </a:r>
+            <a:r>
+              <a:rPr lang="en-SI" sz="1300" dirty="0" err="1"/>
+              <a:t>cene</a:t>
+            </a:r>
+            <a:r>
+              <a:rPr lang="en-SI" sz="1300" dirty="0"/>
+              <a:t> </a:t>
+            </a:r>
+            <a:r>
+              <a:rPr lang="en-SI" sz="1300" dirty="0" err="1"/>
+              <a:t>elektrike</a:t>
+            </a:r>
+            <a:r>
+              <a:rPr lang="en-SI" sz="1300" dirty="0"/>
+              <a:t> so </a:t>
+            </a:r>
+            <a:r>
+              <a:rPr lang="en-SI" sz="1300" dirty="0" err="1"/>
+              <a:t>agregirane</a:t>
+            </a:r>
+            <a:r>
+              <a:rPr lang="en-SI" sz="1300" dirty="0"/>
+              <a:t> </a:t>
+            </a:r>
+            <a:r>
+              <a:rPr lang="en-SI" sz="1300" dirty="0" err="1"/>
+              <a:t>količina</a:t>
+            </a:r>
+            <a:r>
+              <a:rPr lang="en-SI" sz="1300" dirty="0"/>
+              <a:t> </a:t>
+            </a:r>
+            <a:r>
+              <a:rPr lang="en-SI" sz="1300" dirty="0" err="1"/>
+              <a:t>proizvodnje</a:t>
+            </a:r>
+            <a:r>
+              <a:rPr lang="en-SI" sz="1300" dirty="0"/>
+              <a:t> pa je </a:t>
+            </a:r>
+            <a:r>
+              <a:rPr lang="en-SI" sz="1300" dirty="0" err="1"/>
+              <a:t>izmerjena</a:t>
+            </a:r>
+            <a:r>
+              <a:rPr lang="en-SI" sz="1300" dirty="0"/>
+              <a:t> in </a:t>
+            </a:r>
+            <a:r>
+              <a:rPr lang="en-SI" sz="1300" dirty="0" err="1"/>
+              <a:t>poročana</a:t>
+            </a:r>
+            <a:r>
+              <a:rPr lang="en-SI" sz="1300" dirty="0"/>
+              <a:t>. </a:t>
+            </a:r>
+            <a:r>
+              <a:rPr lang="en-SI" sz="1300" dirty="0" err="1"/>
+              <a:t>Podatki</a:t>
+            </a:r>
+            <a:r>
+              <a:rPr lang="en-SI" sz="1300" dirty="0"/>
+              <a:t> </a:t>
+            </a:r>
+            <a:r>
+              <a:rPr lang="en-SI" sz="1300" dirty="0" err="1"/>
+              <a:t>obsegajo</a:t>
+            </a:r>
+            <a:r>
+              <a:rPr lang="en-SI" sz="1300" dirty="0"/>
+              <a:t> </a:t>
+            </a:r>
+            <a:r>
+              <a:rPr lang="en-SI" sz="1300" dirty="0" err="1"/>
+              <a:t>proizvodnjo</a:t>
+            </a:r>
+            <a:r>
+              <a:rPr lang="en-SI" sz="1300" dirty="0"/>
               <a:t>, </a:t>
             </a:r>
             <a:r>
-              <a:rPr lang="en-US" sz="1600" dirty="0" err="1"/>
-              <a:t>slike</a:t>
-            </a:r>
-            <a:r>
-              <a:rPr lang="en-US" sz="1600" dirty="0"/>
+              <a:rPr lang="en-SI" sz="1300" dirty="0" err="1"/>
+              <a:t>porabo</a:t>
+            </a:r>
+            <a:r>
+              <a:rPr lang="en-SI" sz="1300" dirty="0"/>
               <a:t>, </a:t>
             </a:r>
             <a:r>
-              <a:rPr lang="en-US" sz="1600" dirty="0" err="1"/>
-              <a:t>meritve</a:t>
-            </a:r>
-            <a:r>
-              <a:rPr lang="en-US" sz="1600" dirty="0"/>
-              <a:t>, </a:t>
-            </a:r>
-            <a:r>
-              <a:rPr lang="en-US" sz="1600" dirty="0" err="1"/>
-              <a:t>števci</a:t>
-            </a:r>
-            <a:r>
-              <a:rPr lang="en-US" sz="1600" dirty="0"/>
-              <a:t>, </a:t>
-            </a:r>
-            <a:r>
-              <a:rPr lang="en-US" sz="1600" dirty="0" err="1"/>
-              <a:t>statistike</a:t>
-            </a:r>
-            <a:r>
-              <a:rPr lang="en-US" sz="1600" dirty="0"/>
-              <a:t>,…) in </a:t>
-            </a:r>
-            <a:r>
-              <a:rPr lang="en-US" sz="1600" dirty="0" err="1"/>
-              <a:t>obseg</a:t>
-            </a:r>
-            <a:r>
-              <a:rPr lang="en-US" sz="1600" dirty="0"/>
-              <a:t> </a:t>
-            </a:r>
-            <a:r>
-              <a:rPr lang="en-US" sz="1600" dirty="0" err="1"/>
+              <a:rPr lang="en-SI" sz="1300" dirty="0" err="1"/>
+              <a:t>ceno</a:t>
+            </a:r>
+            <a:r>
+              <a:rPr lang="en-SI" sz="1300" dirty="0"/>
+              <a:t>, ... za </a:t>
+            </a:r>
+            <a:r>
+              <a:rPr lang="en-SI" sz="1300" dirty="0" err="1"/>
+              <a:t>gospodinjstva</a:t>
+            </a:r>
+            <a:r>
+              <a:rPr lang="en-SI" sz="1300" dirty="0"/>
+              <a:t>, ne </a:t>
+            </a:r>
+            <a:r>
+              <a:rPr lang="en-SI" sz="1300" dirty="0" err="1"/>
+              <a:t>gospodinjstva</a:t>
+            </a:r>
+            <a:r>
+              <a:rPr lang="en-SI" sz="1300" dirty="0"/>
+              <a:t>. </a:t>
+            </a:r>
+            <a:r>
+              <a:rPr lang="en-SI" sz="1300" dirty="0" err="1"/>
+              <a:t>Večina</a:t>
+            </a:r>
+            <a:r>
+              <a:rPr lang="en-SI" sz="1300" dirty="0"/>
+              <a:t> </a:t>
+            </a:r>
+            <a:r>
+              <a:rPr lang="en-SI" sz="1300" dirty="0" err="1"/>
               <a:t>podatkov</a:t>
             </a:r>
             <a:r>
-              <a:rPr lang="en-US" sz="1600" dirty="0"/>
-              <a:t> (</a:t>
-            </a:r>
-            <a:r>
-              <a:rPr lang="en-US" sz="1600" dirty="0" err="1"/>
-              <a:t>koliko</a:t>
-            </a:r>
-            <a:r>
-              <a:rPr lang="en-US" sz="1600" dirty="0"/>
-              <a:t> </a:t>
-            </a:r>
-            <a:r>
-              <a:rPr lang="en-US" sz="1600" dirty="0" err="1"/>
-              <a:t>primerov</a:t>
-            </a:r>
-            <a:r>
-              <a:rPr lang="en-US" sz="1600" dirty="0"/>
-              <a:t>, </a:t>
-            </a:r>
-            <a:r>
-              <a:rPr lang="en-US" sz="1600" dirty="0" err="1"/>
-              <a:t>koliko</a:t>
-            </a:r>
-            <a:r>
-              <a:rPr lang="en-US" sz="1600" dirty="0"/>
-              <a:t> </a:t>
-            </a:r>
-            <a:r>
-              <a:rPr lang="en-US" sz="1600" dirty="0" err="1"/>
-              <a:t>atributov</a:t>
-            </a:r>
-            <a:r>
-              <a:rPr lang="en-US" sz="1600" dirty="0"/>
-              <a:t>, </a:t>
-            </a:r>
-            <a:r>
-              <a:rPr lang="en-US" sz="1600" dirty="0" err="1"/>
-              <a:t>koliko</a:t>
-            </a:r>
-            <a:r>
-              <a:rPr lang="en-US" sz="1600" dirty="0"/>
-              <a:t> </a:t>
-            </a:r>
-            <a:r>
-              <a:rPr lang="en-US" sz="1600" dirty="0" err="1"/>
-              <a:t>razredov</a:t>
-            </a:r>
-            <a:r>
-              <a:rPr lang="en-US" sz="1600" dirty="0"/>
-              <a:t>, …)</a:t>
-            </a:r>
+              <a:rPr lang="en-SI" sz="1300" dirty="0"/>
+              <a:t> je </a:t>
+            </a:r>
+            <a:r>
+              <a:rPr lang="en-SI" sz="1300" dirty="0" err="1"/>
+              <a:t>zato</a:t>
+            </a:r>
+            <a:r>
+              <a:rPr lang="en-SI" sz="1300" dirty="0"/>
+              <a:t> </a:t>
+            </a:r>
+            <a:r>
+              <a:rPr lang="en-SI" sz="1300" dirty="0" err="1"/>
+              <a:t>multidimenzionalna</a:t>
+            </a:r>
+            <a:r>
+              <a:rPr lang="en-SI" sz="1300" dirty="0"/>
+              <a:t> z </a:t>
+            </a:r>
+            <a:r>
+              <a:rPr lang="en-SI" sz="1300" dirty="0" err="1"/>
+              <a:t>atributi</a:t>
+            </a:r>
+            <a:r>
+              <a:rPr lang="en-SI" sz="1300" dirty="0"/>
+              <a:t>.</a:t>
+            </a:r>
+            <a:endParaRPr lang="en-US" sz="1300" dirty="0"/>
           </a:p>
           <a:p>
             <a:pPr>
@@ -3951,50 +3972,337 @@
               <a:buChar char="-"/>
             </a:pPr>
             <a:r>
-              <a:rPr lang="en-US" sz="1600" dirty="0" err="1"/>
-              <a:t>število</a:t>
-            </a:r>
-            <a:r>
-              <a:rPr lang="en-US" sz="1600" dirty="0"/>
-              <a:t> </a:t>
-            </a:r>
-            <a:r>
-              <a:rPr lang="en-US" sz="1600" dirty="0" err="1"/>
+              <a:rPr lang="en-SI" sz="1600" dirty="0" err="1"/>
+              <a:t>Obstajajo</a:t>
+            </a:r>
+            <a:r>
+              <a:rPr lang="en-SI" sz="1600" dirty="0"/>
+              <a:t> </a:t>
+            </a:r>
+            <a:r>
+              <a:rPr lang="en-SI" sz="1600" dirty="0" err="1"/>
+              <a:t>manjše</a:t>
+            </a:r>
+            <a:r>
+              <a:rPr lang="en-SI" sz="1600" dirty="0"/>
+              <a:t> </a:t>
+            </a:r>
+            <a:r>
+              <a:rPr lang="en-SI" sz="1600" dirty="0" err="1"/>
+              <a:t>količine</a:t>
+            </a:r>
+            <a:r>
+              <a:rPr lang="en-SI" sz="1600" dirty="0"/>
+              <a:t> </a:t>
+            </a:r>
+            <a:r>
+              <a:rPr lang="en-SI" sz="1600" dirty="0" err="1"/>
               <a:t>manjkajočih</a:t>
             </a:r>
             <a:r>
-              <a:rPr lang="en-US" sz="1600" dirty="0"/>
-              <a:t> </a:t>
-            </a:r>
-            <a:r>
-              <a:rPr lang="en-US" sz="1600" dirty="0" err="1"/>
-              <a:t>zapisov</a:t>
-            </a:r>
-            <a:r>
-              <a:rPr lang="en-US" sz="1600" dirty="0"/>
+              <a:rPr lang="en-SI" sz="1600" dirty="0"/>
+              <a:t> </a:t>
+            </a:r>
+            <a:r>
+              <a:rPr lang="en-SI" sz="1600" dirty="0" err="1"/>
+              <a:t>podatkov</a:t>
+            </a:r>
+            <a:endParaRPr lang="en-SI" sz="1600" dirty="0"/>
+          </a:p>
+          <a:p>
+            <a:pPr lvl="1">
+              <a:buFontTx/>
+              <a:buChar char="-"/>
+            </a:pPr>
+            <a:r>
+              <a:rPr lang="en-SI" sz="1300" dirty="0" err="1"/>
+              <a:t>Manjkajo</a:t>
+            </a:r>
+            <a:r>
+              <a:rPr lang="en-SI" sz="1300" dirty="0"/>
               <a:t>, </a:t>
             </a:r>
             <a:r>
-              <a:rPr lang="en-US" sz="1600" dirty="0" err="1"/>
-              <a:t>napak</a:t>
-            </a:r>
-            <a:r>
-              <a:rPr lang="en-US" sz="1600" dirty="0"/>
+              <a:rPr lang="en-SI" sz="1300" dirty="0" err="1"/>
+              <a:t>na</a:t>
+            </a:r>
+            <a:r>
+              <a:rPr lang="en-SI" sz="1300" dirty="0"/>
+              <a:t> primer, </a:t>
+            </a:r>
+            <a:r>
+              <a:rPr lang="en-SI" sz="1300" dirty="0" err="1"/>
+              <a:t>ker</a:t>
+            </a:r>
+            <a:r>
+              <a:rPr lang="en-SI" sz="1300" dirty="0"/>
+              <a:t> se </a:t>
+            </a:r>
+            <a:r>
+              <a:rPr lang="en-SI" sz="1300" dirty="0" err="1"/>
+              <a:t>meritve</a:t>
+            </a:r>
+            <a:r>
+              <a:rPr lang="en-SI" sz="1300" dirty="0"/>
+              <a:t> za </a:t>
+            </a:r>
+            <a:r>
+              <a:rPr lang="en-SI" sz="1300" dirty="0" err="1"/>
+              <a:t>neko</a:t>
+            </a:r>
+            <a:r>
+              <a:rPr lang="en-SI" sz="1300" dirty="0"/>
+              <a:t> </a:t>
+            </a:r>
+            <a:r>
+              <a:rPr lang="en-SI" sz="1300" dirty="0" err="1"/>
+              <a:t>kategorijo</a:t>
+            </a:r>
+            <a:r>
+              <a:rPr lang="en-SI" sz="1300" dirty="0"/>
+              <a:t> </a:t>
+            </a:r>
+            <a:r>
+              <a:rPr lang="en-SI" sz="1300" dirty="0" err="1"/>
+              <a:t>ob</a:t>
+            </a:r>
+            <a:r>
+              <a:rPr lang="en-SI" sz="1300" dirty="0"/>
+              <a:t> </a:t>
+            </a:r>
+            <a:r>
+              <a:rPr lang="en-SI" sz="1300" dirty="0" err="1"/>
+              <a:t>nekem</a:t>
+            </a:r>
+            <a:r>
+              <a:rPr lang="en-SI" sz="1300" dirty="0"/>
+              <a:t> </a:t>
+            </a:r>
+            <a:r>
+              <a:rPr lang="en-SI" sz="1300" dirty="0" err="1"/>
+              <a:t>času</a:t>
+            </a:r>
+            <a:r>
+              <a:rPr lang="en-SI" sz="1300" dirty="0"/>
+              <a:t> </a:t>
+            </a:r>
+            <a:r>
+              <a:rPr lang="en-SI" sz="1300" dirty="0" err="1"/>
+              <a:t>še</a:t>
+            </a:r>
+            <a:r>
+              <a:rPr lang="en-SI" sz="1300" dirty="0"/>
+              <a:t> </a:t>
+            </a:r>
+            <a:r>
+              <a:rPr lang="en-SI" sz="1300" dirty="0" err="1"/>
+              <a:t>niso</a:t>
+            </a:r>
+            <a:r>
+              <a:rPr lang="en-SI" sz="1300" dirty="0"/>
+              <a:t> </a:t>
+            </a:r>
+            <a:r>
+              <a:rPr lang="en-SI" sz="1300" dirty="0" err="1"/>
+              <a:t>izvajale</a:t>
+            </a:r>
+            <a:r>
+              <a:rPr lang="en-SI" sz="1300" dirty="0"/>
               <a:t>, </a:t>
             </a:r>
             <a:r>
-              <a:rPr lang="en-US" sz="1600" dirty="0" err="1"/>
+              <a:rPr lang="en-SI" sz="1300" dirty="0" err="1"/>
+              <a:t>medtem</a:t>
+            </a:r>
+            <a:r>
+              <a:rPr lang="en-SI" sz="1300" dirty="0"/>
+              <a:t> ko se za </a:t>
+            </a:r>
+            <a:r>
+              <a:rPr lang="en-SI" sz="1300" dirty="0" err="1"/>
               <a:t>druge</a:t>
             </a:r>
             <a:r>
-              <a:rPr lang="en-US" sz="1600" dirty="0"/>
-              <a:t> </a:t>
-            </a:r>
-            <a:r>
-              <a:rPr lang="en-US" sz="1600" dirty="0" err="1"/>
-              <a:t>težave</a:t>
-            </a:r>
-            <a:endParaRPr lang="en-US" sz="1600" dirty="0"/>
+              <a:rPr lang="en-SI" sz="1300" dirty="0"/>
+              <a:t> so </a:t>
+            </a:r>
+            <a:r>
+              <a:rPr lang="en-SI" sz="1300" dirty="0" err="1"/>
+              <a:t>ter</a:t>
+            </a:r>
+            <a:r>
+              <a:rPr lang="en-SI" sz="1300" dirty="0"/>
+              <a:t> </a:t>
+            </a:r>
+            <a:r>
+              <a:rPr lang="sl-SI" sz="1300" dirty="0"/>
+              <a:t>so</a:t>
+            </a:r>
+            <a:r>
+              <a:rPr lang="en-SI" sz="1300" dirty="0"/>
+              <a:t> se </a:t>
+            </a:r>
+            <a:r>
+              <a:rPr lang="en-SI" sz="1300" dirty="0" err="1"/>
+              <a:t>podatki</a:t>
+            </a:r>
+            <a:r>
+              <a:rPr lang="en-SI" sz="1300" dirty="0"/>
+              <a:t> </a:t>
+            </a:r>
+            <a:r>
+              <a:rPr lang="en-SI" sz="1300" dirty="0" err="1"/>
+              <a:t>nato</a:t>
+            </a:r>
+            <a:r>
+              <a:rPr lang="en-SI" sz="1300" dirty="0"/>
+              <a:t> </a:t>
+            </a:r>
+            <a:r>
+              <a:rPr lang="en-SI" sz="1300" dirty="0" err="1"/>
+              <a:t>združili</a:t>
+            </a:r>
+            <a:r>
+              <a:rPr lang="en-SI" sz="1300" dirty="0"/>
+              <a:t> v </a:t>
+            </a:r>
+            <a:r>
+              <a:rPr lang="en-SI" sz="1300" dirty="0" err="1"/>
+              <a:t>eno</a:t>
+            </a:r>
+            <a:r>
+              <a:rPr lang="en-SI" sz="1300" dirty="0"/>
+              <a:t> </a:t>
+            </a:r>
+            <a:r>
+              <a:rPr lang="en-SI" sz="1300" dirty="0" err="1"/>
+              <a:t>tabelo</a:t>
+            </a:r>
+            <a:r>
+              <a:rPr lang="en-SI" sz="1300" dirty="0"/>
+              <a:t>. </a:t>
+            </a:r>
+            <a:r>
+              <a:rPr lang="en-SI" sz="1300" dirty="0" err="1"/>
+              <a:t>Možno</a:t>
+            </a:r>
+            <a:r>
+              <a:rPr lang="en-SI" sz="1300" dirty="0"/>
+              <a:t> je </a:t>
+            </a:r>
+            <a:r>
+              <a:rPr lang="en-SI" sz="1300" dirty="0" err="1"/>
+              <a:t>tudi</a:t>
+            </a:r>
+            <a:r>
+              <a:rPr lang="en-SI" sz="1300" dirty="0"/>
+              <a:t>, da se </a:t>
+            </a:r>
+            <a:r>
+              <a:rPr lang="en-SI" sz="1300" dirty="0" err="1"/>
+              <a:t>meritve</a:t>
+            </a:r>
+            <a:r>
+              <a:rPr lang="en-SI" sz="1300" dirty="0"/>
+              <a:t> </a:t>
+            </a:r>
+            <a:r>
+              <a:rPr lang="en-SI" sz="1300" dirty="0" err="1"/>
+              <a:t>takrat</a:t>
+            </a:r>
+            <a:r>
+              <a:rPr lang="en-SI" sz="1300" dirty="0"/>
+              <a:t> </a:t>
+            </a:r>
+            <a:r>
+              <a:rPr lang="en-SI" sz="1300" dirty="0" err="1"/>
+              <a:t>niso</a:t>
+            </a:r>
+            <a:r>
+              <a:rPr lang="en-SI" sz="1300" dirty="0"/>
+              <a:t> </a:t>
+            </a:r>
+            <a:r>
+              <a:rPr lang="en-SI" sz="1300" dirty="0" err="1"/>
+              <a:t>izvajale</a:t>
+            </a:r>
+            <a:r>
+              <a:rPr lang="en-SI" sz="1300" dirty="0"/>
+              <a:t>, </a:t>
+            </a:r>
+            <a:r>
+              <a:rPr lang="en-SI" sz="1300" dirty="0" err="1"/>
+              <a:t>ker</a:t>
+            </a:r>
+            <a:r>
+              <a:rPr lang="en-SI" sz="1300" dirty="0"/>
+              <a:t> bi bile </a:t>
+            </a:r>
+            <a:r>
+              <a:rPr lang="en-SI" sz="1300" dirty="0" err="1"/>
+              <a:t>irelevantne</a:t>
+            </a:r>
+            <a:r>
+              <a:rPr lang="en-SI" sz="1300" dirty="0"/>
+              <a:t> (</a:t>
+            </a:r>
+            <a:r>
+              <a:rPr lang="en-SI" sz="1300" dirty="0" err="1"/>
+              <a:t>merjenje</a:t>
+            </a:r>
+            <a:r>
+              <a:rPr lang="en-SI" sz="1300" dirty="0"/>
+              <a:t> </a:t>
+            </a:r>
+            <a:r>
+              <a:rPr lang="en-SI" sz="1300" dirty="0" err="1"/>
+              <a:t>nečesa</a:t>
+            </a:r>
+            <a:r>
+              <a:rPr lang="en-SI" sz="1300" dirty="0"/>
+              <a:t> </a:t>
+            </a:r>
+            <a:r>
+              <a:rPr lang="en-SI" sz="1300" dirty="0" err="1"/>
+              <a:t>kar</a:t>
+            </a:r>
+            <a:r>
+              <a:rPr lang="en-SI" sz="1300" dirty="0"/>
+              <a:t> ne </a:t>
+            </a:r>
+            <a:r>
+              <a:rPr lang="en-SI" sz="1300" dirty="0" err="1"/>
+              <a:t>obstaja</a:t>
+            </a:r>
+            <a:r>
+              <a:rPr lang="en-SI" sz="1300" dirty="0"/>
+              <a:t> – </a:t>
+            </a:r>
+            <a:r>
+              <a:rPr lang="en-SI" sz="1300" dirty="0" err="1"/>
+              <a:t>npr</a:t>
+            </a:r>
+            <a:r>
+              <a:rPr lang="en-SI" sz="1300" dirty="0"/>
+              <a:t>. </a:t>
+            </a:r>
+            <a:r>
+              <a:rPr lang="en-SI" sz="1300" dirty="0" err="1"/>
+              <a:t>veterne</a:t>
+            </a:r>
+            <a:r>
+              <a:rPr lang="en-SI" sz="1300" dirty="0"/>
+              <a:t> </a:t>
+            </a:r>
+            <a:r>
+              <a:rPr lang="en-SI" sz="1300" dirty="0" err="1"/>
+              <a:t>elektrarne</a:t>
+            </a:r>
+            <a:r>
+              <a:rPr lang="en-SI" sz="1300" dirty="0"/>
+              <a:t>.)</a:t>
+            </a:r>
+            <a:endParaRPr lang="en-US" sz="1300" dirty="0"/>
           </a:p>
           <a:p>
             <a:pPr>
@@ -4002,77 +4310,239 @@
               <a:buChar char="-"/>
             </a:pPr>
             <a:r>
-              <a:rPr lang="en-US" sz="1600" dirty="0" err="1"/>
-              <a:t>opis</a:t>
-            </a:r>
-            <a:r>
-              <a:rPr lang="en-US" sz="1600" dirty="0"/>
-              <a:t> </a:t>
-            </a:r>
-            <a:r>
-              <a:rPr lang="en-US" sz="1600" dirty="0" err="1"/>
-              <a:t>predprocesiranja</a:t>
-            </a:r>
-            <a:r>
-              <a:rPr lang="en-US" sz="1600" dirty="0"/>
-              <a:t>, da </a:t>
-            </a:r>
-            <a:r>
-              <a:rPr lang="en-US" sz="1600" dirty="0" err="1"/>
-              <a:t>postanejo</a:t>
-            </a:r>
-            <a:r>
-              <a:rPr lang="en-US" sz="1600" dirty="0"/>
-              <a:t> </a:t>
-            </a:r>
-            <a:r>
-              <a:rPr lang="en-US" sz="1600" dirty="0" err="1"/>
-              <a:t>podatki</a:t>
-            </a:r>
-            <a:r>
-              <a:rPr lang="en-US" sz="1600" dirty="0"/>
-              <a:t> “</a:t>
-            </a:r>
-            <a:r>
-              <a:rPr lang="en-US" sz="1600" dirty="0" err="1"/>
-              <a:t>uporabni</a:t>
-            </a:r>
-            <a:r>
-              <a:rPr lang="en-US" sz="1600" dirty="0"/>
-              <a:t>” (</a:t>
-            </a:r>
-            <a:r>
-              <a:rPr lang="en-US" sz="1600" dirty="0" err="1"/>
-              <a:t>pretvorbe</a:t>
-            </a:r>
-            <a:r>
-              <a:rPr lang="en-US" sz="1600" dirty="0"/>
+              <a:rPr lang="en-SI" sz="1600" dirty="0" err="1"/>
+              <a:t>Predprocesiranje</a:t>
+            </a:r>
+            <a:endParaRPr lang="en-SI" sz="1600" dirty="0"/>
+          </a:p>
+          <a:p>
+            <a:pPr lvl="1">
+              <a:buFontTx/>
+              <a:buChar char="-"/>
+            </a:pPr>
+            <a:r>
+              <a:rPr lang="en-SI" sz="1400" dirty="0" err="1"/>
+              <a:t>Podatki</a:t>
+            </a:r>
+            <a:r>
+              <a:rPr lang="en-SI" sz="1400" dirty="0"/>
+              <a:t> so </a:t>
+            </a:r>
+            <a:r>
+              <a:rPr lang="en-SI" sz="1400" dirty="0" err="1"/>
+              <a:t>originalno</a:t>
+            </a:r>
+            <a:r>
+              <a:rPr lang="en-SI" sz="1400" dirty="0"/>
+              <a:t> v </a:t>
+            </a:r>
+            <a:r>
+              <a:rPr lang="en-SI" sz="1400" dirty="0" err="1"/>
+              <a:t>obliki</a:t>
+            </a:r>
+            <a:r>
+              <a:rPr lang="en-SI" sz="1400" dirty="0"/>
+              <a:t> PX </a:t>
+            </a:r>
+            <a:r>
+              <a:rPr lang="en-SI" sz="1400" dirty="0" err="1"/>
+              <a:t>datoteke</a:t>
+            </a:r>
+            <a:r>
+              <a:rPr lang="en-SI" sz="1400" dirty="0"/>
+              <a:t>, ki je v </a:t>
+            </a:r>
+            <a:r>
+              <a:rPr lang="en-SI" sz="1400" dirty="0" err="1"/>
+              <a:t>namenskih</a:t>
+            </a:r>
+            <a:r>
+              <a:rPr lang="en-SI" sz="1400" dirty="0"/>
+              <a:t> </a:t>
+            </a:r>
+            <a:r>
+              <a:rPr lang="en-SI" sz="1400" dirty="0" err="1"/>
+              <a:t>programih</a:t>
+            </a:r>
+            <a:r>
+              <a:rPr lang="en-SI" sz="1400" dirty="0"/>
+              <a:t> </a:t>
+            </a:r>
+            <a:r>
+              <a:rPr lang="en-SI" sz="1400" dirty="0" err="1"/>
+              <a:t>zelo</a:t>
+            </a:r>
+            <a:r>
+              <a:rPr lang="en-SI" sz="1400" dirty="0"/>
+              <a:t> </a:t>
+            </a:r>
+            <a:r>
+              <a:rPr lang="en-SI" sz="1400" dirty="0" err="1"/>
+              <a:t>pregledna</a:t>
+            </a:r>
+            <a:r>
+              <a:rPr lang="en-SI" sz="1400" dirty="0"/>
+              <a:t> </a:t>
+            </a:r>
+            <a:r>
+              <a:rPr lang="en-SI" sz="1400" dirty="0" err="1"/>
+              <a:t>vendar</a:t>
+            </a:r>
+            <a:r>
+              <a:rPr lang="en-SI" sz="1400" dirty="0"/>
+              <a:t> je </a:t>
+            </a:r>
+            <a:r>
+              <a:rPr lang="en-SI" sz="1400" dirty="0" err="1"/>
+              <a:t>pri</a:t>
+            </a:r>
+            <a:r>
+              <a:rPr lang="en-SI" sz="1400" dirty="0"/>
+              <a:t> </a:t>
+            </a:r>
+            <a:r>
+              <a:rPr lang="en-SI" sz="1400" dirty="0" err="1"/>
+              <a:t>procesiranju</a:t>
+            </a:r>
+            <a:r>
+              <a:rPr lang="en-SI" sz="1400" dirty="0"/>
+              <a:t> </a:t>
+            </a:r>
+            <a:r>
+              <a:rPr lang="en-SI" sz="1400" dirty="0" err="1"/>
+              <a:t>dokaj</a:t>
+            </a:r>
+            <a:r>
+              <a:rPr lang="en-SI" sz="1400" dirty="0"/>
+              <a:t> </a:t>
+            </a:r>
+            <a:r>
+              <a:rPr lang="en-SI" sz="1400" dirty="0" err="1"/>
+              <a:t>neuporabna</a:t>
+            </a:r>
+            <a:r>
+              <a:rPr lang="en-SI" sz="1400" dirty="0"/>
+              <a:t>. </a:t>
+            </a:r>
+            <a:r>
+              <a:rPr lang="en-SI" sz="1400" dirty="0" err="1"/>
+              <a:t>Zato</a:t>
+            </a:r>
+            <a:r>
+              <a:rPr lang="en-SI" sz="1400" dirty="0"/>
+              <a:t> se </a:t>
+            </a:r>
+            <a:r>
+              <a:rPr lang="en-SI" sz="1400" dirty="0" err="1"/>
+              <a:t>jih</a:t>
+            </a:r>
+            <a:r>
+              <a:rPr lang="en-SI" sz="1400" dirty="0"/>
+              <a:t> </a:t>
+            </a:r>
+            <a:r>
+              <a:rPr lang="en-SI" sz="1400" dirty="0" err="1"/>
+              <a:t>pretvori</a:t>
+            </a:r>
+            <a:r>
+              <a:rPr lang="en-SI" sz="1400" dirty="0"/>
+              <a:t> v CSV </a:t>
+            </a:r>
+            <a:r>
+              <a:rPr lang="en-SI" sz="1400" dirty="0" err="1"/>
+              <a:t>datoteke</a:t>
+            </a:r>
+            <a:r>
+              <a:rPr lang="en-SI" sz="1400" dirty="0"/>
               <a:t>, </a:t>
             </a:r>
             <a:r>
-              <a:rPr lang="en-US" sz="1600" dirty="0" err="1"/>
-              <a:t>filtriranje</a:t>
-            </a:r>
-            <a:r>
-              <a:rPr lang="en-US" sz="1600" dirty="0"/>
-              <a:t>, </a:t>
-            </a:r>
-            <a:r>
-              <a:rPr lang="en-US" sz="1600" dirty="0" err="1"/>
-              <a:t>obravnava</a:t>
-            </a:r>
-            <a:r>
-              <a:rPr lang="en-US" sz="1600" dirty="0"/>
-              <a:t> </a:t>
-            </a:r>
-            <a:r>
-              <a:rPr lang="en-US" sz="1600" dirty="0" err="1"/>
-              <a:t>napak</a:t>
-            </a:r>
-            <a:r>
-              <a:rPr lang="en-US" sz="1600" dirty="0"/>
-              <a:t>…)</a:t>
-            </a:r>
+              <a:rPr lang="en-SI" sz="1400" dirty="0" err="1"/>
+              <a:t>kjer</a:t>
+            </a:r>
+            <a:r>
+              <a:rPr lang="en-SI" sz="1400" dirty="0"/>
+              <a:t> se </a:t>
+            </a:r>
+            <a:r>
+              <a:rPr lang="en-SI" sz="1400" dirty="0" err="1"/>
+              <a:t>ohranijo</a:t>
+            </a:r>
+            <a:r>
+              <a:rPr lang="en-SI" sz="1400" dirty="0"/>
+              <a:t> le </a:t>
+            </a:r>
+            <a:r>
+              <a:rPr lang="en-SI" sz="1400" dirty="0" err="1"/>
+              <a:t>določeni</a:t>
+            </a:r>
+            <a:r>
+              <a:rPr lang="en-SI" sz="1400" dirty="0"/>
+              <a:t> </a:t>
+            </a:r>
+            <a:r>
+              <a:rPr lang="en-SI" sz="1400" dirty="0" err="1"/>
+              <a:t>atributi</a:t>
+            </a:r>
+            <a:r>
+              <a:rPr lang="en-SI" sz="1400" dirty="0"/>
+              <a:t>, ki so </a:t>
+            </a:r>
+            <a:r>
+              <a:rPr lang="en-SI" sz="1400" dirty="0" err="1"/>
+              <a:t>zanimivi</a:t>
+            </a:r>
+            <a:r>
+              <a:rPr lang="en-SI" sz="1400" dirty="0"/>
+              <a:t> za </a:t>
+            </a:r>
+            <a:r>
+              <a:rPr lang="en-SI" sz="1400" dirty="0" err="1"/>
+              <a:t>določeno</a:t>
+            </a:r>
+            <a:r>
+              <a:rPr lang="en-SI" sz="1400" dirty="0"/>
+              <a:t> </a:t>
+            </a:r>
+            <a:r>
+              <a:rPr lang="en-SI" sz="1400" dirty="0" err="1"/>
+              <a:t>raziskavo</a:t>
+            </a:r>
+            <a:r>
+              <a:rPr lang="en-SI" sz="1400" dirty="0"/>
+              <a:t>.</a:t>
+            </a:r>
+            <a:endParaRPr lang="en-US" sz="1300" dirty="0"/>
+          </a:p>
+          <a:p>
+            <a:pPr marL="0" indent="0">
+              <a:buNone/>
+            </a:pPr>
+            <a:r>
+              <a:rPr lang="en-US" sz="1600" b="1" dirty="0" err="1"/>
+              <a:t>Glavn</a:t>
+            </a:r>
+            <a:r>
+              <a:rPr lang="en-SI" sz="1600" b="1" dirty="0" err="1"/>
+              <a:t>i</a:t>
+            </a:r>
+            <a:r>
+              <a:rPr lang="en-SI" sz="1600" b="1" dirty="0"/>
+              <a:t> </a:t>
+            </a:r>
+            <a:r>
+              <a:rPr lang="en-US" sz="1600" b="1" dirty="0" err="1"/>
+              <a:t>cilji</a:t>
+            </a:r>
+            <a:r>
+              <a:rPr lang="en-US" sz="1600" b="1" dirty="0"/>
+              <a:t> </a:t>
+            </a:r>
+            <a:r>
+              <a:rPr lang="en-SI" sz="1600" b="1" dirty="0" err="1"/>
+              <a:t>projekta</a:t>
+            </a:r>
+            <a:endParaRPr lang="en-SI" sz="1600" b="1" dirty="0"/>
           </a:p>
           <a:p>
             <a:pPr>
@@ -4081,7 +4551,7 @@
             </a:pPr>
             <a:r>
               <a:rPr lang="en-US" sz="1600" dirty="0" err="1"/>
-              <a:t>združevanje</a:t>
+              <a:t>Kako</a:t>
             </a:r>
             <a:r>
               <a:rPr lang="en-US" sz="1600" dirty="0"/>
@@ -4089,58 +4559,189 @@
             </a:r>
             <a:r>
               <a:rPr lang="en-US" sz="1600" dirty="0" err="1"/>
-              <a:t>virov</a:t>
-            </a:r>
-            <a:endParaRPr lang="en-US" sz="1600" dirty="0"/>
+              <a:t>močno</a:t>
+            </a:r>
+            <a:r>
+              <a:rPr lang="en-US" sz="1600" dirty="0"/>
+              <a:t> </a:t>
+            </a:r>
+            <a:r>
+              <a:rPr lang="en-US" sz="1600" dirty="0" err="1"/>
+              <a:t>vpliva</a:t>
+            </a:r>
+            <a:r>
+              <a:rPr lang="en-US" sz="1600" dirty="0"/>
+              <a:t> </a:t>
+            </a:r>
+            <a:r>
+              <a:rPr lang="en-US" sz="1600" dirty="0" err="1"/>
+              <a:t>poraba</a:t>
+            </a:r>
+            <a:r>
+              <a:rPr lang="en-US" sz="1600" dirty="0"/>
+              <a:t> </a:t>
+            </a:r>
+            <a:r>
+              <a:rPr lang="en-US" sz="1600" dirty="0" err="1"/>
+              <a:t>elektrike</a:t>
+            </a:r>
+            <a:r>
+              <a:rPr lang="en-US" sz="1600" dirty="0"/>
+              <a:t> </a:t>
+            </a:r>
+            <a:r>
+              <a:rPr lang="en-US" sz="1600" dirty="0" err="1"/>
+              <a:t>na</a:t>
+            </a:r>
+            <a:r>
+              <a:rPr lang="en-US" sz="1600" dirty="0"/>
+              <a:t> </a:t>
+            </a:r>
+            <a:r>
+              <a:rPr lang="en-US" sz="1600" dirty="0" err="1"/>
+              <a:t>njeno</a:t>
+            </a:r>
+            <a:r>
+              <a:rPr lang="en-US" sz="1600" dirty="0"/>
+              <a:t> </a:t>
+            </a:r>
+            <a:r>
+              <a:rPr lang="en-US" sz="1600" dirty="0" err="1"/>
+              <a:t>ceno</a:t>
+            </a:r>
+            <a:r>
+              <a:rPr lang="en-US" sz="1600" dirty="0"/>
+              <a:t>?</a:t>
+            </a:r>
+          </a:p>
+          <a:p>
+            <a:pPr lvl="1">
+              <a:buFontTx/>
+              <a:buChar char="-"/>
+            </a:pPr>
+            <a:r>
+              <a:rPr lang="en-US" sz="1300" dirty="0"/>
+              <a:t>Ali </a:t>
+            </a:r>
+            <a:r>
+              <a:rPr lang="en-US" sz="1300" dirty="0" err="1"/>
+              <a:t>imajo</a:t>
+            </a:r>
+            <a:r>
+              <a:rPr lang="en-US" sz="1300" dirty="0"/>
+              <a:t> </a:t>
+            </a:r>
+            <a:r>
+              <a:rPr lang="en-US" sz="1300" dirty="0" err="1"/>
+              <a:t>zasebne</a:t>
+            </a:r>
+            <a:r>
+              <a:rPr lang="en-US" sz="1300" dirty="0"/>
+              <a:t> mini-</a:t>
+            </a:r>
+            <a:r>
+              <a:rPr lang="en-US" sz="1300" dirty="0" err="1"/>
+              <a:t>elektrarne</a:t>
+            </a:r>
+            <a:r>
+              <a:rPr lang="en-US" sz="1300" dirty="0"/>
+              <a:t> </a:t>
+            </a:r>
+            <a:r>
+              <a:rPr lang="en-US" sz="1300" dirty="0" err="1"/>
+              <a:t>vpliv</a:t>
+            </a:r>
+            <a:r>
+              <a:rPr lang="en-US" sz="1300" dirty="0"/>
+              <a:t> </a:t>
+            </a:r>
+            <a:r>
+              <a:rPr lang="en-US" sz="1300" dirty="0" err="1"/>
+              <a:t>na</a:t>
+            </a:r>
+            <a:r>
+              <a:rPr lang="en-US" sz="1300" dirty="0"/>
+              <a:t> </a:t>
+            </a:r>
+            <a:r>
+              <a:rPr lang="en-US" sz="1300" dirty="0" err="1"/>
+              <a:t>ceno</a:t>
+            </a:r>
+            <a:r>
+              <a:rPr lang="en-US" sz="1300" dirty="0"/>
+              <a:t> </a:t>
+            </a:r>
+            <a:r>
+              <a:rPr lang="en-US" sz="1300" dirty="0" err="1"/>
+              <a:t>elektrike</a:t>
+            </a:r>
+            <a:r>
+              <a:rPr lang="en-US" sz="1300" dirty="0"/>
+              <a:t>?</a:t>
+            </a:r>
           </a:p>
           <a:p>
             <a:pPr>
               <a:buFontTx/>
               <a:buChar char="-"/>
             </a:pPr>
-            <a:endParaRPr lang="en-US" sz="1600" dirty="0"/>
-          </a:p>
-          <a:p>
-            <a:pPr marL="0" indent="0">
-              <a:buNone/>
-            </a:pPr>
-            <a:r>
-              <a:rPr lang="en-US" sz="1600" b="1" dirty="0" err="1"/>
-              <a:t>Glavna</a:t>
-            </a:r>
-            <a:r>
-              <a:rPr lang="en-US" sz="1600" b="1" dirty="0"/>
-              <a:t> </a:t>
-            </a:r>
-            <a:r>
-              <a:rPr lang="en-US" sz="1600" b="1" dirty="0" err="1"/>
-              <a:t>vprašanja</a:t>
-            </a:r>
-            <a:r>
-              <a:rPr lang="en-US" sz="1600" b="1" dirty="0"/>
-              <a:t>/</a:t>
-            </a:r>
-            <a:r>
-              <a:rPr lang="en-US" sz="1600" b="1" dirty="0" err="1"/>
-              <a:t>cilji</a:t>
-            </a:r>
-            <a:r>
-              <a:rPr lang="en-US" sz="1600" b="1" dirty="0"/>
-              <a:t> </a:t>
-            </a:r>
-            <a:r>
-              <a:rPr lang="en-US" sz="1600" b="1" dirty="0" err="1"/>
-              <a:t>podatkovnega</a:t>
-            </a:r>
-            <a:r>
-              <a:rPr lang="en-US" sz="1600" b="1" dirty="0"/>
-              <a:t> </a:t>
-            </a:r>
-            <a:r>
-              <a:rPr lang="en-US" sz="1600" b="1" dirty="0" err="1"/>
-              <a:t>rudarjenja</a:t>
-            </a:r>
-            <a:endParaRPr lang="en-US" sz="1600" b="1" dirty="0"/>
+            <a:r>
+              <a:rPr lang="en-US" sz="1600" dirty="0" err="1"/>
+              <a:t>Kakšno</a:t>
+            </a:r>
+            <a:r>
+              <a:rPr lang="en-US" sz="1600" dirty="0"/>
+              <a:t> je </a:t>
+            </a:r>
+            <a:r>
+              <a:rPr lang="en-US" sz="1600" dirty="0" err="1"/>
+              <a:t>razmerje</a:t>
+            </a:r>
+            <a:r>
+              <a:rPr lang="en-US" sz="1600" dirty="0"/>
+              <a:t> med </a:t>
+            </a:r>
+            <a:r>
+              <a:rPr lang="en-US" sz="1600" dirty="0" err="1"/>
+              <a:t>proizvodnjo</a:t>
+            </a:r>
+            <a:r>
+              <a:rPr lang="en-US" sz="1600" dirty="0"/>
+              <a:t> in </a:t>
+            </a:r>
+            <a:r>
+              <a:rPr lang="en-US" sz="1600" dirty="0" err="1"/>
+              <a:t>porabo</a:t>
+            </a:r>
+            <a:r>
+              <a:rPr lang="en-US" sz="1600" dirty="0"/>
+              <a:t> </a:t>
+            </a:r>
+            <a:r>
+              <a:rPr lang="en-US" sz="1600" dirty="0" err="1"/>
+              <a:t>električne</a:t>
+            </a:r>
+            <a:r>
+              <a:rPr lang="en-US" sz="1600" dirty="0"/>
+              <a:t> </a:t>
+            </a:r>
+            <a:r>
+              <a:rPr lang="en-US" sz="1600" dirty="0" err="1"/>
+              <a:t>energije</a:t>
+            </a:r>
+            <a:r>
+              <a:rPr lang="en-US" sz="1600" dirty="0"/>
+              <a:t> v </a:t>
+            </a:r>
+            <a:r>
+              <a:rPr lang="en-US" sz="1600" dirty="0" err="1"/>
+              <a:t>Sloveniji</a:t>
+            </a:r>
+            <a:r>
+              <a:rPr lang="en-US" sz="1600" dirty="0"/>
+              <a:t>? </a:t>
+            </a:r>
+            <a:endParaRPr lang="en-SI" sz="1600" dirty="0"/>
           </a:p>
           <a:p>
             <a:pPr>
@@ -4149,63 +4750,59 @@
             </a:pPr>
             <a:r>
               <a:rPr lang="en-US" sz="1600" dirty="0" err="1"/>
-              <a:t>Vprašanje</a:t>
+              <a:t>Kakšni</a:t>
             </a:r>
             <a:r>
               <a:rPr lang="en-US" sz="1600" dirty="0"/>
-              <a:t>/</a:t>
+              <a:t> so </a:t>
             </a:r>
             <a:r>
               <a:rPr lang="en-US" sz="1600" dirty="0" err="1"/>
-              <a:t>Cilj</a:t>
+              <a:t>premiki</a:t>
             </a:r>
             <a:r>
               <a:rPr lang="en-US" sz="1600" dirty="0"/>
-              <a:t> 1</a:t>
-            </a:r>
-          </a:p>
-          <a:p>
-            <a:pPr>
-              <a:buFontTx/>
-              <a:buChar char="-"/>
-            </a:pPr>
+              <a:t> </a:t>
+            </a:r>
             <a:r>
               <a:rPr lang="en-US" sz="1600" dirty="0" err="1"/>
-              <a:t>Vprašanje</a:t>
+              <a:t>električne</a:t>
             </a:r>
             <a:r>
               <a:rPr lang="en-US" sz="1600" dirty="0"/>
-              <a:t>/</a:t>
+              <a:t> </a:t>
             </a:r>
             <a:r>
               <a:rPr lang="en-US" sz="1600" dirty="0" err="1"/>
-              <a:t>Cilj</a:t>
+              <a:t>industrije</a:t>
             </a:r>
             <a:r>
               <a:rPr lang="en-US" sz="1600" dirty="0"/>
-              <a:t> 2</a:t>
-            </a:r>
-          </a:p>
-          <a:p>
-            <a:pPr>
-              <a:buFontTx/>
-              <a:buChar char="-"/>
-            </a:pPr>
+              <a:t> v </a:t>
+            </a:r>
             <a:r>
               <a:rPr lang="en-US" sz="1600" dirty="0" err="1"/>
-              <a:t>Vprašanje</a:t>
+              <a:t>Sloveniji</a:t>
             </a:r>
             <a:r>
               <a:rPr lang="en-US" sz="1600" dirty="0"/>
-              <a:t>/</a:t>
+              <a:t> v </a:t>
             </a:r>
             <a:r>
               <a:rPr lang="en-US" sz="1600" dirty="0" err="1"/>
-              <a:t>Cilj</a:t>
+              <a:t>zeleno</a:t>
             </a:r>
             <a:r>
               <a:rPr lang="en-US" sz="1600" dirty="0"/>
-              <a:t> 3</a:t>
+              <a:t> </a:t>
+            </a:r>
+            <a:r>
+              <a:rPr lang="en-US" sz="1600" dirty="0" err="1"/>
+              <a:t>smer</a:t>
+            </a:r>
+            <a:r>
+              <a:rPr lang="en-US" sz="1600" dirty="0"/>
+              <a:t>?</a:t>
             </a:r>
           </a:p>
         </p:txBody>
@@ -4410,6 +5007,36 @@
           <a:chExt cx="0" cy="0"/>
         </a:xfrm>
       </p:grpSpPr>
+      <p:pic>
+        <p:nvPicPr>
+          <p:cNvPr id="23" name="Picture 22" descr="Chart, line chart&#10;&#10;Description automatically generated">
+            <a:extLst>
+              <a:ext uri="{FF2B5EF4-FFF2-40B4-BE49-F238E27FC236}">
+                <a16:creationId xmlns:a16="http://schemas.microsoft.com/office/drawing/2014/main" id="{69587E18-5038-6BB8-5A7C-60836D001291}"/>
+              </a:ext>
+            </a:extLst>
+          </p:cNvPr>
+          <p:cNvPicPr>
+            <a:picLocks noChangeAspect="1"/>
+          </p:cNvPicPr>
+          <p:nvPr/>
+        </p:nvPicPr>
+        <p:blipFill>
+          <a:blip r:embed="rId2"/>
+          <a:stretch>
+            <a:fillRect/>
+          </a:stretch>
+        </p:blipFill>
+        <p:spPr>
+          <a:xfrm>
+            <a:off x="4225538" y="1818424"/>
+            <a:ext cx="5189120" cy="2915502"/>
+          </a:xfrm>
+          <a:prstGeom prst="rect">
+            <a:avLst/>
+          </a:prstGeom>
+        </p:spPr>
+      </p:pic>
       <p:sp>
         <p:nvSpPr>
           <p:cNvPr id="3" name="Content Placeholder 2">
@@ -4439,7 +5066,7 @@
         </p:spPr>
         <p:txBody>
           <a:bodyPr>
-            <a:normAutofit/>
+            <a:normAutofit fontScale="77500" lnSpcReduction="20000"/>
           </a:bodyPr>
           <a:lstStyle/>
           <a:p>
@@ -4447,69 +5074,190 @@
               <a:buNone/>
             </a:pPr>
             <a:r>
-              <a:rPr lang="en-US" sz="1600" dirty="0" err="1"/>
+              <a:rPr lang="en-US" sz="1800" b="1" dirty="0" err="1"/>
               <a:t>Kako</a:t>
             </a:r>
             <a:r>
-              <a:rPr lang="en-US" sz="1600" dirty="0"/>
-              <a:t> </a:t>
-            </a:r>
-            <a:r>
-              <a:rPr lang="en-US" sz="1600" dirty="0" err="1"/>
-              <a:t>boste</a:t>
-            </a:r>
-            <a:r>
-              <a:rPr lang="en-US" sz="1600" dirty="0"/>
-              <a:t> </a:t>
-            </a:r>
-            <a:r>
-              <a:rPr lang="en-US" sz="1600" dirty="0" err="1"/>
-              <a:t>dosegli</a:t>
-            </a:r>
-            <a:r>
-              <a:rPr lang="en-US" sz="1600" dirty="0"/>
-              <a:t> </a:t>
-            </a:r>
-            <a:r>
-              <a:rPr lang="en-US" sz="1600" dirty="0" err="1"/>
-              <a:t>cilj</a:t>
-            </a:r>
-            <a:r>
-              <a:rPr lang="en-US" sz="1600" dirty="0"/>
-              <a:t> 1 </a:t>
-            </a:r>
-            <a:r>
-              <a:rPr lang="en-US" sz="1600" dirty="0" err="1"/>
-              <a:t>oziroma</a:t>
-            </a:r>
-            <a:r>
-              <a:rPr lang="en-US" sz="1600" dirty="0"/>
-              <a:t> </a:t>
-            </a:r>
-            <a:r>
-              <a:rPr lang="en-US" sz="1600" dirty="0" err="1"/>
-              <a:t>odgovorili</a:t>
-            </a:r>
-            <a:r>
-              <a:rPr lang="en-US" sz="1600" dirty="0"/>
-              <a:t> </a:t>
-            </a:r>
-            <a:r>
-              <a:rPr lang="en-US" sz="1600" dirty="0" err="1"/>
+              <a:rPr lang="en-US" sz="1800" b="1" dirty="0"/>
+              <a:t> </a:t>
+            </a:r>
+            <a:r>
+              <a:rPr lang="en-US" sz="1800" b="1" dirty="0" err="1"/>
+              <a:t>močno</a:t>
+            </a:r>
+            <a:r>
+              <a:rPr lang="en-US" sz="1800" b="1" dirty="0"/>
+              <a:t> </a:t>
+            </a:r>
+            <a:r>
+              <a:rPr lang="en-US" sz="1800" b="1" dirty="0" err="1"/>
+              <a:t>vpliva</a:t>
+            </a:r>
+            <a:r>
+              <a:rPr lang="en-US" sz="1800" b="1" dirty="0"/>
+              <a:t> </a:t>
+            </a:r>
+            <a:r>
+              <a:rPr lang="en-US" sz="1800" b="1" dirty="0" err="1"/>
+              <a:t>poraba</a:t>
+            </a:r>
+            <a:r>
+              <a:rPr lang="en-US" sz="1800" b="1" dirty="0"/>
+              <a:t> </a:t>
+            </a:r>
+            <a:r>
+              <a:rPr lang="en-US" sz="1800" b="1" dirty="0" err="1"/>
+              <a:t>elektrike</a:t>
+            </a:r>
+            <a:r>
+              <a:rPr lang="en-US" sz="1800" b="1" dirty="0"/>
+              <a:t> </a:t>
+            </a:r>
+            <a:r>
+              <a:rPr lang="en-US" sz="1800" b="1" dirty="0" err="1"/>
               <a:t>na</a:t>
             </a:r>
             <a:r>
-              <a:rPr lang="en-US" sz="1600" dirty="0"/>
-              <a:t> </a:t>
-            </a:r>
-            <a:r>
-              <a:rPr lang="en-US" sz="1600" dirty="0" err="1"/>
-              <a:t>vprašanje</a:t>
-            </a:r>
-            <a:r>
-              <a:rPr lang="en-US" sz="1600" dirty="0"/>
-              <a:t> 1…</a:t>
-            </a:r>
+              <a:rPr lang="en-US" sz="1800" b="1" dirty="0"/>
+              <a:t> </a:t>
+            </a:r>
+            <a:r>
+              <a:rPr lang="en-US" sz="1800" b="1" dirty="0" err="1"/>
+              <a:t>njeno</a:t>
+            </a:r>
+            <a:r>
+              <a:rPr lang="en-US" sz="1800" b="1" dirty="0"/>
+              <a:t> </a:t>
+            </a:r>
+            <a:r>
+              <a:rPr lang="en-US" sz="1800" b="1" dirty="0" err="1"/>
+              <a:t>ceno</a:t>
+            </a:r>
+            <a:r>
+              <a:rPr lang="en-SI" sz="1800" b="1" dirty="0"/>
+              <a:t> in a</a:t>
+            </a:r>
+            <a:r>
+              <a:rPr lang="en-US" sz="1800" b="1" dirty="0"/>
+              <a:t>li </a:t>
+            </a:r>
+            <a:r>
+              <a:rPr lang="en-US" sz="1800" b="1" dirty="0" err="1"/>
+              <a:t>imajo</a:t>
+            </a:r>
+            <a:r>
+              <a:rPr lang="en-US" sz="1800" b="1" dirty="0"/>
+              <a:t> </a:t>
+            </a:r>
+            <a:r>
+              <a:rPr lang="en-US" sz="1800" b="1" dirty="0" err="1"/>
+              <a:t>zasebne</a:t>
+            </a:r>
+            <a:r>
+              <a:rPr lang="en-US" sz="1800" b="1" dirty="0"/>
+              <a:t> mini-</a:t>
+            </a:r>
+            <a:r>
+              <a:rPr lang="en-US" sz="1800" b="1" dirty="0" err="1"/>
+              <a:t>elektrarne</a:t>
+            </a:r>
+            <a:r>
+              <a:rPr lang="en-US" sz="1800" b="1" dirty="0"/>
+              <a:t> </a:t>
+            </a:r>
+            <a:r>
+              <a:rPr lang="en-US" sz="1800" b="1" dirty="0" err="1"/>
+              <a:t>vpliv</a:t>
+            </a:r>
+            <a:r>
+              <a:rPr lang="en-US" sz="1800" b="1" dirty="0"/>
+              <a:t> </a:t>
+            </a:r>
+            <a:r>
+              <a:rPr lang="en-US" sz="1800" b="1" dirty="0" err="1"/>
+              <a:t>na</a:t>
+            </a:r>
+            <a:r>
+              <a:rPr lang="en-US" sz="1800" b="1" dirty="0"/>
+              <a:t> </a:t>
+            </a:r>
+            <a:r>
+              <a:rPr lang="en-US" sz="1800" b="1" dirty="0" err="1"/>
+              <a:t>ceno</a:t>
+            </a:r>
+            <a:r>
+              <a:rPr lang="en-US" sz="1800" b="1" dirty="0"/>
+              <a:t> </a:t>
+            </a:r>
+            <a:r>
+              <a:rPr lang="en-US" sz="1800" b="1" dirty="0" err="1"/>
+              <a:t>elektrike</a:t>
+            </a:r>
+            <a:r>
+              <a:rPr lang="en-US" sz="1800" b="1" dirty="0"/>
+              <a:t>?</a:t>
+            </a:r>
+            <a:endParaRPr lang="en-SI" sz="1800" b="1" dirty="0"/>
+          </a:p>
+          <a:p>
+            <a:pPr marL="0" indent="0">
+              <a:buNone/>
+            </a:pPr>
+            <a:endParaRPr lang="en-SI" sz="1600" dirty="0"/>
+          </a:p>
+          <a:p>
+            <a:pPr marL="0" indent="0">
+              <a:buNone/>
+            </a:pPr>
+            <a:r>
+              <a:rPr lang="sl-SI" sz="1600" dirty="0"/>
+              <a:t>Vprašanje o porabi elektrike in njenem strošku je kompleksen problem, saj obstaja veliko spremenljivk, ki lahko vplivajo na ceno električne energije. Nekateri dejavniki, ki vplivajo na ceno elektrike, vključujejo: </a:t>
+            </a:r>
+            <a:r>
+              <a:rPr lang="sl-SI" sz="1600" i="1" dirty="0"/>
+              <a:t>vir proizvodnje, povpraševanje, sezonske spremembe, nihanja v oskrbi, politične spremembe </a:t>
+            </a:r>
+            <a:r>
+              <a:rPr lang="sl-SI" sz="1600" dirty="0"/>
+              <a:t>in še več.</a:t>
+            </a:r>
+          </a:p>
+          <a:p>
+            <a:pPr marL="0" indent="0">
+              <a:buNone/>
+            </a:pPr>
+            <a:r>
+              <a:rPr lang="sl-SI" sz="1600" dirty="0"/>
+              <a:t>Poraba elektrike ima lahko tudi pomemben vpliv na njeno ceno. Povpraševanje po električni energiji se lahko razlikuje </a:t>
+            </a:r>
+            <a:r>
+              <a:rPr lang="sl-SI" sz="1600" i="1" dirty="0"/>
+              <a:t>glede na letni čas, delovni čas, gospodarske razmere in druge dejavnike</a:t>
+            </a:r>
+            <a:r>
+              <a:rPr lang="sl-SI" sz="1600" dirty="0"/>
+              <a:t>. </a:t>
+            </a:r>
+            <a:endParaRPr lang="en-SI" sz="1600" dirty="0"/>
+          </a:p>
+          <a:p>
+            <a:pPr marL="0" indent="0">
+              <a:buNone/>
+            </a:pPr>
+            <a:r>
+              <a:rPr lang="sl-SI" sz="1600" dirty="0"/>
+              <a:t>Glede vpliva zasebnih mini-elektrarn na ceno elektrike obstaja različno mnenje. Nekateri menijo, da lahko zasebne mini-elektrarne pomagajo zmanjšati ceno elektrike, saj proizvajajo energijo v bližini porabnika, kar zmanjšuje izgube pri prenosu. Drugi pa menijo, da lahko zasebne mini-elektrarne povzročijo višje stroške za proizvodnjo električne energije, saj so lahko manj učinkovite kot večje elektrarne.</a:t>
+            </a:r>
+          </a:p>
+          <a:p>
+            <a:pPr marL="0" indent="0">
+              <a:buNone/>
+            </a:pPr>
+            <a:r>
+              <a:rPr lang="sl-SI" sz="1600" dirty="0"/>
+              <a:t>V celoti je težko natančno ugotoviti, kako močno vpliva poraba elektrike na njeno ceno in ali imajo zasebne mini-elektrarne vpliv na ceno elektrike. Različni dejavniki lahko vplivajo na ceno elektrike, zato je potrebna natančna analiza, da bi lahko prišli do natančnih zaključkov.</a:t>
+            </a:r>
+            <a:endParaRPr lang="en-SI" sz="1600" dirty="0"/>
           </a:p>
         </p:txBody>
       </p:sp>
@@ -4542,11 +5290,266 @@
         </p:spPr>
         <p:txBody>
           <a:bodyPr>
-            <a:normAutofit/>
+            <a:normAutofit fontScale="77500" lnSpcReduction="20000"/>
           </a:bodyPr>
           <a:lstStyle/>
           <a:p>
-            <a:endParaRPr lang="en-US" sz="1600" dirty="0"/>
+            <a:pPr marL="0" indent="0">
+              <a:buNone/>
+            </a:pPr>
+            <a:r>
+              <a:rPr lang="en-SI" sz="1600" dirty="0" err="1"/>
+              <a:t>Trenutno</a:t>
+            </a:r>
+            <a:r>
+              <a:rPr lang="en-SI" sz="1600" dirty="0"/>
+              <a:t> </a:t>
+            </a:r>
+            <a:r>
+              <a:rPr lang="en-SI" sz="1600" dirty="0" err="1"/>
+              <a:t>sva</a:t>
+            </a:r>
+            <a:r>
+              <a:rPr lang="en-SI" sz="1600" dirty="0"/>
+              <a:t> </a:t>
+            </a:r>
+            <a:r>
+              <a:rPr lang="en-SI" sz="1600" dirty="0" err="1"/>
+              <a:t>še</a:t>
+            </a:r>
+            <a:r>
+              <a:rPr lang="en-SI" sz="1600" dirty="0"/>
+              <a:t> v </a:t>
+            </a:r>
+            <a:r>
+              <a:rPr lang="en-SI" sz="1600" dirty="0" err="1"/>
+              <a:t>fazi</a:t>
+            </a:r>
+            <a:r>
+              <a:rPr lang="en-SI" sz="1600" dirty="0"/>
+              <a:t> </a:t>
+            </a:r>
+            <a:r>
+              <a:rPr lang="en-SI" sz="1600" dirty="0" err="1"/>
+              <a:t>analize</a:t>
+            </a:r>
+            <a:r>
+              <a:rPr lang="en-SI" sz="1600" dirty="0"/>
+              <a:t> </a:t>
+            </a:r>
+            <a:r>
+              <a:rPr lang="en-SI" sz="1600" dirty="0" err="1"/>
+              <a:t>vseh</a:t>
+            </a:r>
+            <a:r>
+              <a:rPr lang="en-SI" sz="1600" dirty="0"/>
+              <a:t> </a:t>
+            </a:r>
+            <a:r>
+              <a:rPr lang="en-SI" sz="1600" dirty="0" err="1"/>
+              <a:t>podatkov</a:t>
+            </a:r>
+            <a:r>
+              <a:rPr lang="en-SI" sz="1600" dirty="0"/>
+              <a:t> in </a:t>
+            </a:r>
+            <a:r>
+              <a:rPr lang="en-SI" sz="1600" dirty="0" err="1"/>
+              <a:t>odgovora</a:t>
+            </a:r>
+            <a:r>
+              <a:rPr lang="en-SI" sz="1600" dirty="0"/>
+              <a:t> </a:t>
+            </a:r>
+            <a:r>
+              <a:rPr lang="en-SI" sz="1600" dirty="0" err="1"/>
+              <a:t>na</a:t>
+            </a:r>
+            <a:r>
+              <a:rPr lang="en-SI" sz="1600" dirty="0"/>
+              <a:t> </a:t>
+            </a:r>
+            <a:r>
+              <a:rPr lang="en-SI" sz="1600" dirty="0" err="1"/>
+              <a:t>vprašanje</a:t>
+            </a:r>
+            <a:r>
+              <a:rPr lang="en-SI" sz="1600" dirty="0"/>
+              <a:t> </a:t>
+            </a:r>
+            <a:r>
+              <a:rPr lang="en-SI" sz="1600" dirty="0" err="1"/>
+              <a:t>še</a:t>
+            </a:r>
+            <a:r>
+              <a:rPr lang="en-SI" sz="1600" dirty="0"/>
+              <a:t> </a:t>
+            </a:r>
+            <a:r>
+              <a:rPr lang="en-SI" sz="1600" dirty="0" err="1"/>
+              <a:t>ni</a:t>
+            </a:r>
+            <a:r>
+              <a:rPr lang="en-SI" sz="1600" dirty="0"/>
+              <a:t>. </a:t>
+            </a:r>
+          </a:p>
+          <a:p>
+            <a:pPr marL="0" indent="0">
+              <a:buNone/>
+            </a:pPr>
+            <a:r>
+              <a:rPr lang="en-SI" sz="1600" dirty="0" err="1"/>
+              <a:t>Pri</a:t>
+            </a:r>
+            <a:r>
+              <a:rPr lang="en-SI" sz="1600" dirty="0"/>
+              <a:t> </a:t>
+            </a:r>
+            <a:r>
+              <a:rPr lang="en-SI" sz="1600" dirty="0" err="1"/>
+              <a:t>analizi</a:t>
+            </a:r>
+            <a:r>
+              <a:rPr lang="en-SI" sz="1600" dirty="0"/>
+              <a:t> se </a:t>
+            </a:r>
+            <a:r>
+              <a:rPr lang="en-SI" sz="1600" dirty="0" err="1"/>
+              <a:t>poizkušava</a:t>
+            </a:r>
+            <a:r>
+              <a:rPr lang="en-SI" sz="1600" dirty="0"/>
+              <a:t> </a:t>
+            </a:r>
+            <a:r>
+              <a:rPr lang="en-SI" sz="1600" dirty="0" err="1"/>
+              <a:t>bolje</a:t>
+            </a:r>
+            <a:r>
+              <a:rPr lang="en-SI" sz="1600" dirty="0"/>
+              <a:t> </a:t>
+            </a:r>
+            <a:r>
+              <a:rPr lang="en-SI" sz="1600" dirty="0" err="1"/>
+              <a:t>spoznati</a:t>
+            </a:r>
+            <a:r>
+              <a:rPr lang="en-SI" sz="1600" dirty="0"/>
+              <a:t> z </a:t>
+            </a:r>
+            <a:r>
+              <a:rPr lang="en-SI" sz="1600" dirty="0" err="1"/>
+              <a:t>domeno</a:t>
+            </a:r>
+            <a:r>
+              <a:rPr lang="en-SI" sz="1600" dirty="0"/>
+              <a:t> </a:t>
+            </a:r>
+            <a:r>
+              <a:rPr lang="en-SI" sz="1600" dirty="0" err="1"/>
+              <a:t>katero</a:t>
+            </a:r>
+            <a:r>
+              <a:rPr lang="en-SI" sz="1600" dirty="0"/>
+              <a:t> </a:t>
+            </a:r>
+            <a:r>
+              <a:rPr lang="en-SI" sz="1600" dirty="0" err="1"/>
+              <a:t>podatki</a:t>
+            </a:r>
+            <a:r>
+              <a:rPr lang="en-SI" sz="1600" dirty="0"/>
+              <a:t> </a:t>
+            </a:r>
+            <a:r>
+              <a:rPr lang="en-SI" sz="1600" dirty="0" err="1"/>
+              <a:t>obsegajo</a:t>
+            </a:r>
+            <a:r>
+              <a:rPr lang="en-SI" sz="1600" dirty="0"/>
+              <a:t>.</a:t>
+            </a:r>
+          </a:p>
+          <a:p>
+            <a:pPr marL="0" indent="0">
+              <a:buNone/>
+            </a:pPr>
+            <a:r>
+              <a:rPr lang="en-SI" sz="1600" dirty="0"/>
+              <a:t>Z </a:t>
+            </a:r>
+            <a:r>
+              <a:rPr lang="en-SI" sz="1600" dirty="0" err="1"/>
+              <a:t>vizualizacijami</a:t>
+            </a:r>
+            <a:r>
+              <a:rPr lang="en-SI" sz="1600" dirty="0"/>
+              <a:t> je </a:t>
+            </a:r>
+            <a:r>
+              <a:rPr lang="en-SI" sz="1600" dirty="0" err="1"/>
+              <a:t>lažje</a:t>
+            </a:r>
+            <a:r>
+              <a:rPr lang="en-SI" sz="1600" dirty="0"/>
+              <a:t> </a:t>
+            </a:r>
+            <a:r>
+              <a:rPr lang="en-SI" sz="1600" dirty="0" err="1"/>
+              <a:t>razumeti</a:t>
+            </a:r>
+            <a:r>
+              <a:rPr lang="en-SI" sz="1600" dirty="0"/>
+              <a:t> </a:t>
+            </a:r>
+            <a:r>
+              <a:rPr lang="en-SI" sz="1600" dirty="0" err="1"/>
+              <a:t>podatke</a:t>
+            </a:r>
+            <a:r>
+              <a:rPr lang="en-SI" sz="1600" dirty="0"/>
+              <a:t>.</a:t>
+            </a:r>
+          </a:p>
+          <a:p>
+            <a:pPr marL="0" indent="0">
+              <a:buNone/>
+            </a:pPr>
+            <a:endParaRPr lang="en-SI" sz="1600" dirty="0"/>
+          </a:p>
+          <a:p>
+            <a:pPr marL="0" indent="0">
+              <a:buNone/>
+            </a:pPr>
+            <a:r>
+              <a:rPr lang="en-SI" sz="1600" dirty="0"/>
+              <a:t>Primer </a:t>
+            </a:r>
+            <a:r>
+              <a:rPr lang="en-SI" sz="1600" dirty="0" err="1"/>
+              <a:t>ene</a:t>
+            </a:r>
+            <a:r>
+              <a:rPr lang="en-SI" sz="1600" dirty="0"/>
+              <a:t> </a:t>
+            </a:r>
+            <a:r>
+              <a:rPr lang="en-SI" sz="1600" dirty="0" err="1"/>
+              <a:t>izmed</a:t>
+            </a:r>
+            <a:r>
+              <a:rPr lang="en-SI" sz="1600" dirty="0"/>
+              <a:t> </a:t>
+            </a:r>
+            <a:r>
+              <a:rPr lang="en-SI" sz="1600" dirty="0" err="1"/>
+              <a:t>vizualizacij</a:t>
+            </a:r>
+            <a:r>
+              <a:rPr lang="en-SI" sz="1600" dirty="0"/>
+              <a:t>:</a:t>
+            </a:r>
           </a:p>
         </p:txBody>
       </p:sp>
@@ -5274,7 +6277,15 @@
           <a:p>
             <a:r>
               <a:rPr lang="en-US" dirty="0"/>
-              <a:t>12. 4. 2023</a:t>
+              <a:t>1</a:t>
+            </a:r>
+            <a:r>
+              <a:rPr lang="en-SI" dirty="0"/>
+              <a:t>9</a:t>
+            </a:r>
+            <a:r>
+              <a:rPr lang="en-US" dirty="0"/>
+              <a:t>. 4. 2023</a:t>
             </a:r>
           </a:p>
         </p:txBody>
@@ -5339,7 +6350,7 @@
 </file>
 
 <file path=ppt/slides/slide3.xml><?xml version="1.0" encoding="utf-8"?>
-<p:sld xmlns:a="http://schemas.openxmlformats.org/drawingml/2006/main" xmlns:r="http://schemas.openxmlformats.org/officeDocument/2006/relationships" xmlns:p="http://schemas.openxmlformats.org/presentationml/2006/main">
+<p:sld xmlns:a="http://schemas.openxmlformats.org/drawingml/2006/main" xmlns:r="http://schemas.openxmlformats.org/officeDocument/2006/relationships" xmlns:p="http://schemas.openxmlformats.org/presentationml/2006/main" show="0">
   <p:cSld>
     <p:spTree>
       <p:nvGrpSpPr>
@@ -5564,7 +6575,15 @@
           <a:p>
             <a:r>
               <a:rPr lang="en-US" dirty="0"/>
-              <a:t>12. 4. 2023</a:t>
+              <a:t>1</a:t>
+            </a:r>
+            <a:r>
+              <a:rPr lang="en-SI" dirty="0"/>
+              <a:t>9</a:t>
+            </a:r>
+            <a:r>
+              <a:rPr lang="en-US" dirty="0"/>
+              <a:t>. 4. 2023</a:t>
             </a:r>
           </a:p>
         </p:txBody>

</xml_diff>